<commit_message>
Docs : update img
</commit_message>
<xml_diff>
--- a/docs/data/img/architecture.pptx
+++ b/docs/data/img/architecture.pptx
@@ -8,6 +8,8 @@
     <p:sldId id="256" r:id="rId2"/>
     <p:sldId id="257" r:id="rId3"/>
     <p:sldId id="258" r:id="rId4"/>
+    <p:sldId id="259" r:id="rId5"/>
+    <p:sldId id="260" r:id="rId6"/>
   </p:sldIdLst>
   <p:sldSz cx="12192000" cy="6858000"/>
   <p:notesSz cx="6858000" cy="9144000"/>
@@ -261,7 +263,7 @@
           <a:p>
             <a:fld id="{78DFFBCA-E506-47B0-B4A9-16FD38837225}" type="datetimeFigureOut">
               <a:rPr lang="ko-KR" altLang="en-US" smtClean="0"/>
-              <a:t>2023-01-22</a:t>
+              <a:t>2023-01-27</a:t>
             </a:fld>
             <a:endParaRPr lang="ko-KR" altLang="en-US"/>
           </a:p>
@@ -459,7 +461,7 @@
           <a:p>
             <a:fld id="{78DFFBCA-E506-47B0-B4A9-16FD38837225}" type="datetimeFigureOut">
               <a:rPr lang="ko-KR" altLang="en-US" smtClean="0"/>
-              <a:t>2023-01-22</a:t>
+              <a:t>2023-01-27</a:t>
             </a:fld>
             <a:endParaRPr lang="ko-KR" altLang="en-US"/>
           </a:p>
@@ -667,7 +669,7 @@
           <a:p>
             <a:fld id="{78DFFBCA-E506-47B0-B4A9-16FD38837225}" type="datetimeFigureOut">
               <a:rPr lang="ko-KR" altLang="en-US" smtClean="0"/>
-              <a:t>2023-01-22</a:t>
+              <a:t>2023-01-27</a:t>
             </a:fld>
             <a:endParaRPr lang="ko-KR" altLang="en-US"/>
           </a:p>
@@ -865,7 +867,7 @@
           <a:p>
             <a:fld id="{78DFFBCA-E506-47B0-B4A9-16FD38837225}" type="datetimeFigureOut">
               <a:rPr lang="ko-KR" altLang="en-US" smtClean="0"/>
-              <a:t>2023-01-22</a:t>
+              <a:t>2023-01-27</a:t>
             </a:fld>
             <a:endParaRPr lang="ko-KR" altLang="en-US"/>
           </a:p>
@@ -1140,7 +1142,7 @@
           <a:p>
             <a:fld id="{78DFFBCA-E506-47B0-B4A9-16FD38837225}" type="datetimeFigureOut">
               <a:rPr lang="ko-KR" altLang="en-US" smtClean="0"/>
-              <a:t>2023-01-22</a:t>
+              <a:t>2023-01-27</a:t>
             </a:fld>
             <a:endParaRPr lang="ko-KR" altLang="en-US"/>
           </a:p>
@@ -1405,7 +1407,7 @@
           <a:p>
             <a:fld id="{78DFFBCA-E506-47B0-B4A9-16FD38837225}" type="datetimeFigureOut">
               <a:rPr lang="ko-KR" altLang="en-US" smtClean="0"/>
-              <a:t>2023-01-22</a:t>
+              <a:t>2023-01-27</a:t>
             </a:fld>
             <a:endParaRPr lang="ko-KR" altLang="en-US"/>
           </a:p>
@@ -1817,7 +1819,7 @@
           <a:p>
             <a:fld id="{78DFFBCA-E506-47B0-B4A9-16FD38837225}" type="datetimeFigureOut">
               <a:rPr lang="ko-KR" altLang="en-US" smtClean="0"/>
-              <a:t>2023-01-22</a:t>
+              <a:t>2023-01-27</a:t>
             </a:fld>
             <a:endParaRPr lang="ko-KR" altLang="en-US"/>
           </a:p>
@@ -1958,7 +1960,7 @@
           <a:p>
             <a:fld id="{78DFFBCA-E506-47B0-B4A9-16FD38837225}" type="datetimeFigureOut">
               <a:rPr lang="ko-KR" altLang="en-US" smtClean="0"/>
-              <a:t>2023-01-22</a:t>
+              <a:t>2023-01-27</a:t>
             </a:fld>
             <a:endParaRPr lang="ko-KR" altLang="en-US"/>
           </a:p>
@@ -2071,7 +2073,7 @@
           <a:p>
             <a:fld id="{78DFFBCA-E506-47B0-B4A9-16FD38837225}" type="datetimeFigureOut">
               <a:rPr lang="ko-KR" altLang="en-US" smtClean="0"/>
-              <a:t>2023-01-22</a:t>
+              <a:t>2023-01-27</a:t>
             </a:fld>
             <a:endParaRPr lang="ko-KR" altLang="en-US"/>
           </a:p>
@@ -2382,7 +2384,7 @@
           <a:p>
             <a:fld id="{78DFFBCA-E506-47B0-B4A9-16FD38837225}" type="datetimeFigureOut">
               <a:rPr lang="ko-KR" altLang="en-US" smtClean="0"/>
-              <a:t>2023-01-22</a:t>
+              <a:t>2023-01-27</a:t>
             </a:fld>
             <a:endParaRPr lang="ko-KR" altLang="en-US"/>
           </a:p>
@@ -2670,7 +2672,7 @@
           <a:p>
             <a:fld id="{78DFFBCA-E506-47B0-B4A9-16FD38837225}" type="datetimeFigureOut">
               <a:rPr lang="ko-KR" altLang="en-US" smtClean="0"/>
-              <a:t>2023-01-22</a:t>
+              <a:t>2023-01-27</a:t>
             </a:fld>
             <a:endParaRPr lang="ko-KR" altLang="en-US"/>
           </a:p>
@@ -2911,7 +2913,7 @@
           <a:p>
             <a:fld id="{78DFFBCA-E506-47B0-B4A9-16FD38837225}" type="datetimeFigureOut">
               <a:rPr lang="ko-KR" altLang="en-US" smtClean="0"/>
-              <a:t>2023-01-22</a:t>
+              <a:t>2023-01-27</a:t>
             </a:fld>
             <a:endParaRPr lang="ko-KR" altLang="en-US"/>
           </a:p>
@@ -5140,6 +5142,1056 @@
 </p:sld>
 </file>
 
+<file path=ppt/slides/slide4.xml><?xml version="1.0" encoding="utf-8"?>
+<p:sld xmlns:a="http://schemas.openxmlformats.org/drawingml/2006/main" xmlns:r="http://schemas.openxmlformats.org/officeDocument/2006/relationships" xmlns:p="http://schemas.openxmlformats.org/presentationml/2006/main">
+  <p:cSld>
+    <p:spTree>
+      <p:nvGrpSpPr>
+        <p:cNvPr id="1" name=""/>
+        <p:cNvGrpSpPr/>
+        <p:nvPr/>
+      </p:nvGrpSpPr>
+      <p:grpSpPr>
+        <a:xfrm>
+          <a:off x="0" y="0"/>
+          <a:ext cx="0" cy="0"/>
+          <a:chOff x="0" y="0"/>
+          <a:chExt cx="0" cy="0"/>
+        </a:xfrm>
+      </p:grpSpPr>
+      <p:sp>
+        <p:nvSpPr>
+          <p:cNvPr id="4" name="사각형: 둥근 모서리 3">
+            <a:extLst>
+              <a:ext uri="{FF2B5EF4-FFF2-40B4-BE49-F238E27FC236}">
+                <a16:creationId xmlns:a16="http://schemas.microsoft.com/office/drawing/2014/main" id="{757CED34-1A95-DF0C-13B7-F1FC352A79A0}"/>
+              </a:ext>
+            </a:extLst>
+          </p:cNvPr>
+          <p:cNvSpPr/>
+          <p:nvPr/>
+        </p:nvSpPr>
+        <p:spPr>
+          <a:xfrm>
+            <a:off x="1313411" y="1066800"/>
+            <a:ext cx="2568632" cy="4998720"/>
+          </a:xfrm>
+          <a:prstGeom prst="roundRect">
+            <a:avLst>
+              <a:gd name="adj" fmla="val 6958"/>
+            </a:avLst>
+          </a:prstGeom>
+          <a:solidFill>
+            <a:schemeClr val="bg1"/>
+          </a:solidFill>
+          <a:ln w="28575"/>
+        </p:spPr>
+        <p:style>
+          <a:lnRef idx="2">
+            <a:schemeClr val="accent1">
+              <a:shade val="50000"/>
+            </a:schemeClr>
+          </a:lnRef>
+          <a:fillRef idx="1">
+            <a:schemeClr val="accent1"/>
+          </a:fillRef>
+          <a:effectRef idx="0">
+            <a:schemeClr val="accent1"/>
+          </a:effectRef>
+          <a:fontRef idx="minor">
+            <a:schemeClr val="lt1"/>
+          </a:fontRef>
+        </p:style>
+        <p:txBody>
+          <a:bodyPr rtlCol="0" anchor="ctr"/>
+          <a:lstStyle/>
+          <a:p>
+            <a:pPr algn="ctr"/>
+            <a:endParaRPr lang="ko-KR" altLang="en-US"/>
+          </a:p>
+        </p:txBody>
+      </p:sp>
+      <p:sp>
+        <p:nvSpPr>
+          <p:cNvPr id="5" name="사각형: 둥근 모서리 4">
+            <a:extLst>
+              <a:ext uri="{FF2B5EF4-FFF2-40B4-BE49-F238E27FC236}">
+                <a16:creationId xmlns:a16="http://schemas.microsoft.com/office/drawing/2014/main" id="{A9FA92CD-4E9C-9C46-77EF-B17BC89474C7}"/>
+              </a:ext>
+            </a:extLst>
+          </p:cNvPr>
+          <p:cNvSpPr/>
+          <p:nvPr/>
+        </p:nvSpPr>
+        <p:spPr>
+          <a:xfrm>
+            <a:off x="4256116" y="1066800"/>
+            <a:ext cx="6775796" cy="4998720"/>
+          </a:xfrm>
+          <a:prstGeom prst="roundRect">
+            <a:avLst/>
+          </a:prstGeom>
+        </p:spPr>
+        <p:style>
+          <a:lnRef idx="2">
+            <a:schemeClr val="accent1">
+              <a:shade val="50000"/>
+            </a:schemeClr>
+          </a:lnRef>
+          <a:fillRef idx="1">
+            <a:schemeClr val="accent1"/>
+          </a:fillRef>
+          <a:effectRef idx="0">
+            <a:schemeClr val="accent1"/>
+          </a:effectRef>
+          <a:fontRef idx="minor">
+            <a:schemeClr val="lt1"/>
+          </a:fontRef>
+        </p:style>
+        <p:txBody>
+          <a:bodyPr rtlCol="0" anchor="ctr"/>
+          <a:lstStyle/>
+          <a:p>
+            <a:pPr algn="ctr"/>
+            <a:r>
+              <a:rPr lang="ko-KR" altLang="en-US" dirty="0"/>
+              <a:t>화면이 나옴</a:t>
+            </a:r>
+          </a:p>
+        </p:txBody>
+      </p:sp>
+      <p:sp>
+        <p:nvSpPr>
+          <p:cNvPr id="6" name="사각형: 둥근 모서리 5">
+            <a:extLst>
+              <a:ext uri="{FF2B5EF4-FFF2-40B4-BE49-F238E27FC236}">
+                <a16:creationId xmlns:a16="http://schemas.microsoft.com/office/drawing/2014/main" id="{7A064833-76DF-F90A-03C3-D30E1238C379}"/>
+              </a:ext>
+            </a:extLst>
+          </p:cNvPr>
+          <p:cNvSpPr/>
+          <p:nvPr/>
+        </p:nvSpPr>
+        <p:spPr>
+          <a:xfrm>
+            <a:off x="1392553" y="4448694"/>
+            <a:ext cx="2394065" cy="1529541"/>
+          </a:xfrm>
+          <a:prstGeom prst="roundRect">
+            <a:avLst/>
+          </a:prstGeom>
+        </p:spPr>
+        <p:style>
+          <a:lnRef idx="2">
+            <a:schemeClr val="accent1">
+              <a:shade val="50000"/>
+            </a:schemeClr>
+          </a:lnRef>
+          <a:fillRef idx="1">
+            <a:schemeClr val="accent1"/>
+          </a:fillRef>
+          <a:effectRef idx="0">
+            <a:schemeClr val="accent1"/>
+          </a:effectRef>
+          <a:fontRef idx="minor">
+            <a:schemeClr val="lt1"/>
+          </a:fontRef>
+        </p:style>
+        <p:txBody>
+          <a:bodyPr rtlCol="0" anchor="ctr"/>
+          <a:lstStyle/>
+          <a:p>
+            <a:pPr algn="ctr"/>
+            <a:endParaRPr lang="ko-KR" altLang="en-US"/>
+          </a:p>
+        </p:txBody>
+      </p:sp>
+      <p:sp>
+        <p:nvSpPr>
+          <p:cNvPr id="7" name="TextBox 6">
+            <a:extLst>
+              <a:ext uri="{FF2B5EF4-FFF2-40B4-BE49-F238E27FC236}">
+                <a16:creationId xmlns:a16="http://schemas.microsoft.com/office/drawing/2014/main" id="{B5797F7B-ACA6-A9A6-336E-E3FBC0C8E889}"/>
+              </a:ext>
+            </a:extLst>
+          </p:cNvPr>
+          <p:cNvSpPr txBox="1"/>
+          <p:nvPr/>
+        </p:nvSpPr>
+        <p:spPr>
+          <a:xfrm>
+            <a:off x="1413164" y="6284422"/>
+            <a:ext cx="877163" cy="369332"/>
+          </a:xfrm>
+          <a:prstGeom prst="rect">
+            <a:avLst/>
+          </a:prstGeom>
+          <a:noFill/>
+        </p:spPr>
+        <p:txBody>
+          <a:bodyPr wrap="none" rtlCol="0">
+            <a:spAutoFit/>
+          </a:bodyPr>
+          <a:lstStyle/>
+          <a:p>
+            <a:r>
+              <a:rPr lang="ko-KR" altLang="en-US" dirty="0"/>
+              <a:t>프로필</a:t>
+            </a:r>
+          </a:p>
+        </p:txBody>
+      </p:sp>
+      <p:cxnSp>
+        <p:nvCxnSpPr>
+          <p:cNvPr id="9" name="연결선: 꺾임 8">
+            <a:extLst>
+              <a:ext uri="{FF2B5EF4-FFF2-40B4-BE49-F238E27FC236}">
+                <a16:creationId xmlns:a16="http://schemas.microsoft.com/office/drawing/2014/main" id="{EF14CE69-1BD8-A32A-93A7-F2CD2C8D164F}"/>
+              </a:ext>
+            </a:extLst>
+          </p:cNvPr>
+          <p:cNvCxnSpPr>
+            <a:cxnSpLocks/>
+            <a:stCxn id="7" idx="3"/>
+            <a:endCxn id="6" idx="2"/>
+          </p:cNvCxnSpPr>
+          <p:nvPr/>
+        </p:nvCxnSpPr>
+        <p:spPr>
+          <a:xfrm flipV="1">
+            <a:off x="2290327" y="5978235"/>
+            <a:ext cx="299259" cy="490853"/>
+          </a:xfrm>
+          <a:prstGeom prst="bentConnector2">
+            <a:avLst/>
+          </a:prstGeom>
+          <a:ln w="28575">
+            <a:solidFill>
+              <a:schemeClr val="tx1"/>
+            </a:solidFill>
+            <a:tailEnd type="triangle"/>
+          </a:ln>
+        </p:spPr>
+        <p:style>
+          <a:lnRef idx="1">
+            <a:schemeClr val="accent1"/>
+          </a:lnRef>
+          <a:fillRef idx="0">
+            <a:schemeClr val="accent1"/>
+          </a:fillRef>
+          <a:effectRef idx="0">
+            <a:schemeClr val="accent1"/>
+          </a:effectRef>
+          <a:fontRef idx="minor">
+            <a:schemeClr val="tx1"/>
+          </a:fontRef>
+        </p:style>
+      </p:cxnSp>
+    </p:spTree>
+    <p:extLst>
+      <p:ext uri="{BB962C8B-B14F-4D97-AF65-F5344CB8AC3E}">
+        <p14:creationId xmlns:p14="http://schemas.microsoft.com/office/powerpoint/2010/main" val="3072269047"/>
+      </p:ext>
+    </p:extLst>
+  </p:cSld>
+  <p:clrMapOvr>
+    <a:masterClrMapping/>
+  </p:clrMapOvr>
+</p:sld>
+</file>
+
+<file path=ppt/slides/slide5.xml><?xml version="1.0" encoding="utf-8"?>
+<p:sld xmlns:a="http://schemas.openxmlformats.org/drawingml/2006/main" xmlns:r="http://schemas.openxmlformats.org/officeDocument/2006/relationships" xmlns:p="http://schemas.openxmlformats.org/presentationml/2006/main">
+  <p:cSld>
+    <p:spTree>
+      <p:nvGrpSpPr>
+        <p:cNvPr id="1" name=""/>
+        <p:cNvGrpSpPr/>
+        <p:nvPr/>
+      </p:nvGrpSpPr>
+      <p:grpSpPr>
+        <a:xfrm>
+          <a:off x="0" y="0"/>
+          <a:ext cx="0" cy="0"/>
+          <a:chOff x="0" y="0"/>
+          <a:chExt cx="0" cy="0"/>
+        </a:xfrm>
+      </p:grpSpPr>
+      <p:pic>
+        <p:nvPicPr>
+          <p:cNvPr id="7" name="그림 6">
+            <a:extLst>
+              <a:ext uri="{FF2B5EF4-FFF2-40B4-BE49-F238E27FC236}">
+                <a16:creationId xmlns:a16="http://schemas.microsoft.com/office/drawing/2014/main" id="{D65FEC92-B915-1A65-3B8E-C0FE79183C5D}"/>
+              </a:ext>
+            </a:extLst>
+          </p:cNvPr>
+          <p:cNvPicPr>
+            <a:picLocks noChangeAspect="1"/>
+          </p:cNvPicPr>
+          <p:nvPr/>
+        </p:nvPicPr>
+        <p:blipFill>
+          <a:blip r:embed="rId2"/>
+          <a:stretch>
+            <a:fillRect/>
+          </a:stretch>
+        </p:blipFill>
+        <p:spPr>
+          <a:xfrm>
+            <a:off x="191573" y="66675"/>
+            <a:ext cx="6789267" cy="6858000"/>
+          </a:xfrm>
+          <a:prstGeom prst="rect">
+            <a:avLst/>
+          </a:prstGeom>
+        </p:spPr>
+      </p:pic>
+      <p:cxnSp>
+        <p:nvCxnSpPr>
+          <p:cNvPr id="9" name="직선 화살표 연결선 8">
+            <a:extLst>
+              <a:ext uri="{FF2B5EF4-FFF2-40B4-BE49-F238E27FC236}">
+                <a16:creationId xmlns:a16="http://schemas.microsoft.com/office/drawing/2014/main" id="{BBE90F68-8686-7345-CF8B-0879A93F31DB}"/>
+              </a:ext>
+            </a:extLst>
+          </p:cNvPr>
+          <p:cNvCxnSpPr/>
+          <p:nvPr/>
+        </p:nvCxnSpPr>
+        <p:spPr>
+          <a:xfrm>
+            <a:off x="1157332" y="1962150"/>
+            <a:ext cx="1628775" cy="0"/>
+          </a:xfrm>
+          <a:prstGeom prst="straightConnector1">
+            <a:avLst/>
+          </a:prstGeom>
+          <a:ln w="38100">
+            <a:solidFill>
+              <a:srgbClr val="00B0F0"/>
+            </a:solidFill>
+            <a:tailEnd type="triangle"/>
+          </a:ln>
+        </p:spPr>
+        <p:style>
+          <a:lnRef idx="1">
+            <a:schemeClr val="accent1"/>
+          </a:lnRef>
+          <a:fillRef idx="0">
+            <a:schemeClr val="accent1"/>
+          </a:fillRef>
+          <a:effectRef idx="0">
+            <a:schemeClr val="accent1"/>
+          </a:effectRef>
+          <a:fontRef idx="minor">
+            <a:schemeClr val="tx1"/>
+          </a:fontRef>
+        </p:style>
+      </p:cxnSp>
+      <p:sp>
+        <p:nvSpPr>
+          <p:cNvPr id="10" name="TextBox 9">
+            <a:extLst>
+              <a:ext uri="{FF2B5EF4-FFF2-40B4-BE49-F238E27FC236}">
+                <a16:creationId xmlns:a16="http://schemas.microsoft.com/office/drawing/2014/main" id="{D780776C-1ED4-CDC3-D1E6-93468AA5CA7E}"/>
+              </a:ext>
+            </a:extLst>
+          </p:cNvPr>
+          <p:cNvSpPr txBox="1"/>
+          <p:nvPr/>
+        </p:nvSpPr>
+        <p:spPr>
+          <a:xfrm>
+            <a:off x="2888541" y="1777484"/>
+            <a:ext cx="2507418" cy="369332"/>
+          </a:xfrm>
+          <a:prstGeom prst="rect">
+            <a:avLst/>
+          </a:prstGeom>
+          <a:noFill/>
+        </p:spPr>
+        <p:txBody>
+          <a:bodyPr wrap="none" rtlCol="0">
+            <a:spAutoFit/>
+          </a:bodyPr>
+          <a:lstStyle/>
+          <a:p>
+            <a:r>
+              <a:rPr lang="ko-KR" altLang="en-US" dirty="0">
+                <a:solidFill>
+                  <a:schemeClr val="bg1"/>
+                </a:solidFill>
+              </a:rPr>
+              <a:t>음성 대화방 입장 버튼</a:t>
+            </a:r>
+          </a:p>
+        </p:txBody>
+      </p:sp>
+      <p:pic>
+        <p:nvPicPr>
+          <p:cNvPr id="12" name="그림 11">
+            <a:extLst>
+              <a:ext uri="{FF2B5EF4-FFF2-40B4-BE49-F238E27FC236}">
+                <a16:creationId xmlns:a16="http://schemas.microsoft.com/office/drawing/2014/main" id="{9327C746-72BD-A1E8-3C7E-2D9628C0740E}"/>
+              </a:ext>
+            </a:extLst>
+          </p:cNvPr>
+          <p:cNvPicPr>
+            <a:picLocks noChangeAspect="1"/>
+          </p:cNvPicPr>
+          <p:nvPr/>
+        </p:nvPicPr>
+        <p:blipFill>
+          <a:blip r:embed="rId3"/>
+          <a:stretch>
+            <a:fillRect/>
+          </a:stretch>
+        </p:blipFill>
+        <p:spPr>
+          <a:xfrm>
+            <a:off x="7144298" y="451547"/>
+            <a:ext cx="2410161" cy="1895740"/>
+          </a:xfrm>
+          <a:prstGeom prst="rect">
+            <a:avLst/>
+          </a:prstGeom>
+        </p:spPr>
+      </p:pic>
+      <p:pic>
+        <p:nvPicPr>
+          <p:cNvPr id="16" name="그림 15">
+            <a:extLst>
+              <a:ext uri="{FF2B5EF4-FFF2-40B4-BE49-F238E27FC236}">
+                <a16:creationId xmlns:a16="http://schemas.microsoft.com/office/drawing/2014/main" id="{2A877BD3-278C-673C-B384-1A7112FB65F3}"/>
+              </a:ext>
+            </a:extLst>
+          </p:cNvPr>
+          <p:cNvPicPr>
+            <a:picLocks noChangeAspect="1"/>
+          </p:cNvPicPr>
+          <p:nvPr/>
+        </p:nvPicPr>
+        <p:blipFill>
+          <a:blip r:embed="rId4"/>
+          <a:stretch>
+            <a:fillRect/>
+          </a:stretch>
+        </p:blipFill>
+        <p:spPr>
+          <a:xfrm>
+            <a:off x="7144299" y="4580586"/>
+            <a:ext cx="2044014" cy="1268123"/>
+          </a:xfrm>
+          <a:prstGeom prst="rect">
+            <a:avLst/>
+          </a:prstGeom>
+        </p:spPr>
+      </p:pic>
+      <p:sp>
+        <p:nvSpPr>
+          <p:cNvPr id="17" name="TextBox 16">
+            <a:extLst>
+              <a:ext uri="{FF2B5EF4-FFF2-40B4-BE49-F238E27FC236}">
+                <a16:creationId xmlns:a16="http://schemas.microsoft.com/office/drawing/2014/main" id="{6836B7BB-7CB0-5A86-3355-20CFA3B2514C}"/>
+              </a:ext>
+            </a:extLst>
+          </p:cNvPr>
+          <p:cNvSpPr txBox="1"/>
+          <p:nvPr/>
+        </p:nvSpPr>
+        <p:spPr>
+          <a:xfrm>
+            <a:off x="7058280" y="4215557"/>
+            <a:ext cx="1818299" cy="369332"/>
+          </a:xfrm>
+          <a:prstGeom prst="rect">
+            <a:avLst/>
+          </a:prstGeom>
+          <a:noFill/>
+        </p:spPr>
+        <p:txBody>
+          <a:bodyPr wrap="square" rtlCol="0">
+            <a:spAutoFit/>
+          </a:bodyPr>
+          <a:lstStyle/>
+          <a:p>
+            <a:r>
+              <a:rPr lang="ko-KR" altLang="en-US" dirty="0"/>
+              <a:t>카메라 공유 시</a:t>
+            </a:r>
+          </a:p>
+        </p:txBody>
+      </p:sp>
+      <p:sp>
+        <p:nvSpPr>
+          <p:cNvPr id="18" name="TextBox 17">
+            <a:extLst>
+              <a:ext uri="{FF2B5EF4-FFF2-40B4-BE49-F238E27FC236}">
+                <a16:creationId xmlns:a16="http://schemas.microsoft.com/office/drawing/2014/main" id="{E84EBFF7-AD84-DB08-A8E6-889BD836D293}"/>
+              </a:ext>
+            </a:extLst>
+          </p:cNvPr>
+          <p:cNvSpPr txBox="1"/>
+          <p:nvPr/>
+        </p:nvSpPr>
+        <p:spPr>
+          <a:xfrm>
+            <a:off x="7144298" y="25724"/>
+            <a:ext cx="1420582" cy="369332"/>
+          </a:xfrm>
+          <a:prstGeom prst="rect">
+            <a:avLst/>
+          </a:prstGeom>
+          <a:noFill/>
+        </p:spPr>
+        <p:txBody>
+          <a:bodyPr wrap="none" rtlCol="0">
+            <a:spAutoFit/>
+          </a:bodyPr>
+          <a:lstStyle/>
+          <a:p>
+            <a:r>
+              <a:rPr lang="ko-KR" altLang="en-US" dirty="0"/>
+              <a:t>화면공유 시</a:t>
+            </a:r>
+          </a:p>
+        </p:txBody>
+      </p:sp>
+      <p:pic>
+        <p:nvPicPr>
+          <p:cNvPr id="20" name="그림 19">
+            <a:extLst>
+              <a:ext uri="{FF2B5EF4-FFF2-40B4-BE49-F238E27FC236}">
+                <a16:creationId xmlns:a16="http://schemas.microsoft.com/office/drawing/2014/main" id="{46E0EA78-571D-2428-EB40-DBFC9F26D10A}"/>
+              </a:ext>
+            </a:extLst>
+          </p:cNvPr>
+          <p:cNvPicPr>
+            <a:picLocks noChangeAspect="1"/>
+          </p:cNvPicPr>
+          <p:nvPr/>
+        </p:nvPicPr>
+        <p:blipFill>
+          <a:blip r:embed="rId5"/>
+          <a:stretch>
+            <a:fillRect/>
+          </a:stretch>
+        </p:blipFill>
+        <p:spPr>
+          <a:xfrm>
+            <a:off x="9742687" y="475363"/>
+            <a:ext cx="2257740" cy="1848108"/>
+          </a:xfrm>
+          <a:prstGeom prst="rect">
+            <a:avLst/>
+          </a:prstGeom>
+        </p:spPr>
+      </p:pic>
+      <p:cxnSp>
+        <p:nvCxnSpPr>
+          <p:cNvPr id="21" name="직선 화살표 연결선 20">
+            <a:extLst>
+              <a:ext uri="{FF2B5EF4-FFF2-40B4-BE49-F238E27FC236}">
+                <a16:creationId xmlns:a16="http://schemas.microsoft.com/office/drawing/2014/main" id="{565EA585-7421-968D-40BB-32830ACBADE8}"/>
+              </a:ext>
+            </a:extLst>
+          </p:cNvPr>
+          <p:cNvCxnSpPr>
+            <a:cxnSpLocks/>
+          </p:cNvCxnSpPr>
+          <p:nvPr/>
+        </p:nvCxnSpPr>
+        <p:spPr>
+          <a:xfrm>
+            <a:off x="10392048" y="1173022"/>
+            <a:ext cx="0" cy="1533525"/>
+          </a:xfrm>
+          <a:prstGeom prst="straightConnector1">
+            <a:avLst/>
+          </a:prstGeom>
+          <a:ln w="38100">
+            <a:solidFill>
+              <a:srgbClr val="00B0F0"/>
+            </a:solidFill>
+            <a:tailEnd type="triangle"/>
+          </a:ln>
+        </p:spPr>
+        <p:style>
+          <a:lnRef idx="1">
+            <a:schemeClr val="accent1"/>
+          </a:lnRef>
+          <a:fillRef idx="0">
+            <a:schemeClr val="accent1"/>
+          </a:fillRef>
+          <a:effectRef idx="0">
+            <a:schemeClr val="accent1"/>
+          </a:effectRef>
+          <a:fontRef idx="minor">
+            <a:schemeClr val="tx1"/>
+          </a:fontRef>
+        </p:style>
+      </p:cxnSp>
+      <p:cxnSp>
+        <p:nvCxnSpPr>
+          <p:cNvPr id="23" name="직선 화살표 연결선 22">
+            <a:extLst>
+              <a:ext uri="{FF2B5EF4-FFF2-40B4-BE49-F238E27FC236}">
+                <a16:creationId xmlns:a16="http://schemas.microsoft.com/office/drawing/2014/main" id="{BB7ACF4C-6038-DD07-2B94-8C947C1AB039}"/>
+              </a:ext>
+            </a:extLst>
+          </p:cNvPr>
+          <p:cNvCxnSpPr>
+            <a:cxnSpLocks/>
+          </p:cNvCxnSpPr>
+          <p:nvPr/>
+        </p:nvCxnSpPr>
+        <p:spPr>
+          <a:xfrm>
+            <a:off x="7514624" y="5261623"/>
+            <a:ext cx="0" cy="1177173"/>
+          </a:xfrm>
+          <a:prstGeom prst="straightConnector1">
+            <a:avLst/>
+          </a:prstGeom>
+          <a:ln w="38100">
+            <a:solidFill>
+              <a:srgbClr val="00B0F0"/>
+            </a:solidFill>
+            <a:tailEnd type="triangle"/>
+          </a:ln>
+        </p:spPr>
+        <p:style>
+          <a:lnRef idx="1">
+            <a:schemeClr val="accent1"/>
+          </a:lnRef>
+          <a:fillRef idx="0">
+            <a:schemeClr val="accent1"/>
+          </a:fillRef>
+          <a:effectRef idx="0">
+            <a:schemeClr val="accent1"/>
+          </a:effectRef>
+          <a:fontRef idx="minor">
+            <a:schemeClr val="tx1"/>
+          </a:fontRef>
+        </p:style>
+      </p:cxnSp>
+      <p:pic>
+        <p:nvPicPr>
+          <p:cNvPr id="26" name="그림 25">
+            <a:extLst>
+              <a:ext uri="{FF2B5EF4-FFF2-40B4-BE49-F238E27FC236}">
+                <a16:creationId xmlns:a16="http://schemas.microsoft.com/office/drawing/2014/main" id="{505CCF52-3056-4FD3-E13C-1F116511AEAC}"/>
+              </a:ext>
+            </a:extLst>
+          </p:cNvPr>
+          <p:cNvPicPr>
+            <a:picLocks noChangeAspect="1"/>
+          </p:cNvPicPr>
+          <p:nvPr/>
+        </p:nvPicPr>
+        <p:blipFill>
+          <a:blip r:embed="rId6"/>
+          <a:stretch>
+            <a:fillRect/>
+          </a:stretch>
+        </p:blipFill>
+        <p:spPr>
+          <a:xfrm>
+            <a:off x="7058280" y="2646128"/>
+            <a:ext cx="4467849" cy="562053"/>
+          </a:xfrm>
+          <a:prstGeom prst="rect">
+            <a:avLst/>
+          </a:prstGeom>
+        </p:spPr>
+      </p:pic>
+      <p:sp>
+        <p:nvSpPr>
+          <p:cNvPr id="27" name="TextBox 26">
+            <a:extLst>
+              <a:ext uri="{FF2B5EF4-FFF2-40B4-BE49-F238E27FC236}">
+                <a16:creationId xmlns:a16="http://schemas.microsoft.com/office/drawing/2014/main" id="{25F7B0AB-C2C5-A2E0-5390-1BF71F6D6829}"/>
+              </a:ext>
+            </a:extLst>
+          </p:cNvPr>
+          <p:cNvSpPr txBox="1"/>
+          <p:nvPr/>
+        </p:nvSpPr>
+        <p:spPr>
+          <a:xfrm>
+            <a:off x="8805062" y="3296134"/>
+            <a:ext cx="3508140" cy="369332"/>
+          </a:xfrm>
+          <a:prstGeom prst="rect">
+            <a:avLst/>
+          </a:prstGeom>
+          <a:noFill/>
+        </p:spPr>
+        <p:txBody>
+          <a:bodyPr wrap="none" rtlCol="0">
+            <a:spAutoFit/>
+          </a:bodyPr>
+          <a:lstStyle/>
+          <a:p>
+            <a:r>
+              <a:rPr lang="en-US" altLang="ko-KR" dirty="0"/>
+              <a:t>Router </a:t>
+            </a:r>
+            <a:r>
+              <a:rPr lang="ko-KR" altLang="en-US" dirty="0"/>
+              <a:t>내부에서 접근을 새로 함</a:t>
+            </a:r>
+          </a:p>
+        </p:txBody>
+      </p:sp>
+      <p:sp>
+        <p:nvSpPr>
+          <p:cNvPr id="28" name="TextBox 27">
+            <a:extLst>
+              <a:ext uri="{FF2B5EF4-FFF2-40B4-BE49-F238E27FC236}">
+                <a16:creationId xmlns:a16="http://schemas.microsoft.com/office/drawing/2014/main" id="{1559C177-2225-F63D-97A9-F9F3453156F3}"/>
+              </a:ext>
+            </a:extLst>
+          </p:cNvPr>
+          <p:cNvSpPr txBox="1"/>
+          <p:nvPr/>
+        </p:nvSpPr>
+        <p:spPr>
+          <a:xfrm>
+            <a:off x="7058319" y="6438796"/>
+            <a:ext cx="1291059" cy="369332"/>
+          </a:xfrm>
+          <a:prstGeom prst="rect">
+            <a:avLst/>
+          </a:prstGeom>
+          <a:noFill/>
+        </p:spPr>
+        <p:txBody>
+          <a:bodyPr wrap="none" rtlCol="0">
+            <a:spAutoFit/>
+          </a:bodyPr>
+          <a:lstStyle/>
+          <a:p>
+            <a:r>
+              <a:rPr lang="en-US" altLang="ko-KR" dirty="0"/>
+              <a:t>On off </a:t>
+            </a:r>
+            <a:r>
+              <a:rPr lang="en-US" altLang="ko-KR" dirty="0" err="1"/>
+              <a:t>btn</a:t>
+            </a:r>
+            <a:endParaRPr lang="ko-KR" altLang="en-US" dirty="0"/>
+          </a:p>
+        </p:txBody>
+      </p:sp>
+      <p:cxnSp>
+        <p:nvCxnSpPr>
+          <p:cNvPr id="29" name="직선 화살표 연결선 28">
+            <a:extLst>
+              <a:ext uri="{FF2B5EF4-FFF2-40B4-BE49-F238E27FC236}">
+                <a16:creationId xmlns:a16="http://schemas.microsoft.com/office/drawing/2014/main" id="{CEC72DE4-46B8-BCF3-A540-42AA9F5402B0}"/>
+              </a:ext>
+            </a:extLst>
+          </p:cNvPr>
+          <p:cNvCxnSpPr>
+            <a:cxnSpLocks/>
+          </p:cNvCxnSpPr>
+          <p:nvPr/>
+        </p:nvCxnSpPr>
+        <p:spPr>
+          <a:xfrm flipV="1">
+            <a:off x="1865152" y="5529185"/>
+            <a:ext cx="14288" cy="487480"/>
+          </a:xfrm>
+          <a:prstGeom prst="straightConnector1">
+            <a:avLst/>
+          </a:prstGeom>
+          <a:ln w="38100">
+            <a:solidFill>
+              <a:srgbClr val="00B0F0"/>
+            </a:solidFill>
+            <a:tailEnd type="triangle"/>
+          </a:ln>
+        </p:spPr>
+        <p:style>
+          <a:lnRef idx="1">
+            <a:schemeClr val="accent1"/>
+          </a:lnRef>
+          <a:fillRef idx="0">
+            <a:schemeClr val="accent1"/>
+          </a:fillRef>
+          <a:effectRef idx="0">
+            <a:schemeClr val="accent1"/>
+          </a:effectRef>
+          <a:fontRef idx="minor">
+            <a:schemeClr val="tx1"/>
+          </a:fontRef>
+        </p:style>
+      </p:cxnSp>
+      <p:sp>
+        <p:nvSpPr>
+          <p:cNvPr id="31" name="TextBox 30">
+            <a:extLst>
+              <a:ext uri="{FF2B5EF4-FFF2-40B4-BE49-F238E27FC236}">
+                <a16:creationId xmlns:a16="http://schemas.microsoft.com/office/drawing/2014/main" id="{7AC65536-FC41-8FC1-C8A1-4805DF67D9C5}"/>
+              </a:ext>
+            </a:extLst>
+          </p:cNvPr>
+          <p:cNvSpPr txBox="1"/>
+          <p:nvPr/>
+        </p:nvSpPr>
+        <p:spPr>
+          <a:xfrm>
+            <a:off x="1099971" y="5076957"/>
+            <a:ext cx="4696542" cy="369332"/>
+          </a:xfrm>
+          <a:prstGeom prst="rect">
+            <a:avLst/>
+          </a:prstGeom>
+          <a:noFill/>
+        </p:spPr>
+        <p:txBody>
+          <a:bodyPr wrap="none" rtlCol="0">
+            <a:spAutoFit/>
+          </a:bodyPr>
+          <a:lstStyle/>
+          <a:p>
+            <a:r>
+              <a:rPr lang="ko-KR" altLang="en-US" dirty="0">
+                <a:solidFill>
+                  <a:schemeClr val="bg1"/>
+                </a:solidFill>
+              </a:rPr>
+              <a:t>대화방 종료 버튼 </a:t>
+            </a:r>
+            <a:r>
+              <a:rPr lang="en-US" altLang="ko-KR" dirty="0">
+                <a:solidFill>
+                  <a:schemeClr val="bg1"/>
+                </a:solidFill>
+              </a:rPr>
+              <a:t>(</a:t>
+            </a:r>
+            <a:r>
+              <a:rPr lang="ko-KR" altLang="en-US" dirty="0">
+                <a:solidFill>
+                  <a:schemeClr val="bg1"/>
+                </a:solidFill>
+              </a:rPr>
+              <a:t>입장한 </a:t>
+            </a:r>
+            <a:r>
+              <a:rPr lang="en-US" altLang="ko-KR" b="1" dirty="0">
+                <a:solidFill>
+                  <a:schemeClr val="bg1"/>
+                </a:solidFill>
+              </a:rPr>
+              <a:t>router</a:t>
+            </a:r>
+            <a:r>
+              <a:rPr lang="ko-KR" altLang="en-US" dirty="0">
+                <a:solidFill>
+                  <a:schemeClr val="bg1"/>
+                </a:solidFill>
+              </a:rPr>
+              <a:t>에서 나감</a:t>
+            </a:r>
+            <a:r>
+              <a:rPr lang="en-US" altLang="ko-KR" dirty="0">
+                <a:solidFill>
+                  <a:schemeClr val="bg1"/>
+                </a:solidFill>
+              </a:rPr>
+              <a:t>.)</a:t>
+            </a:r>
+            <a:endParaRPr lang="ko-KR" altLang="en-US" dirty="0">
+              <a:solidFill>
+                <a:schemeClr val="bg1"/>
+              </a:solidFill>
+            </a:endParaRPr>
+          </a:p>
+        </p:txBody>
+      </p:sp>
+      <p:sp>
+        <p:nvSpPr>
+          <p:cNvPr id="32" name="TextBox 31">
+            <a:extLst>
+              <a:ext uri="{FF2B5EF4-FFF2-40B4-BE49-F238E27FC236}">
+                <a16:creationId xmlns:a16="http://schemas.microsoft.com/office/drawing/2014/main" id="{6123ADD4-8073-77AC-FF98-B10772490D8E}"/>
+              </a:ext>
+            </a:extLst>
+          </p:cNvPr>
+          <p:cNvSpPr txBox="1"/>
+          <p:nvPr/>
+        </p:nvSpPr>
+        <p:spPr>
+          <a:xfrm>
+            <a:off x="9274333" y="3788676"/>
+            <a:ext cx="2917668" cy="1200329"/>
+          </a:xfrm>
+          <a:prstGeom prst="rect">
+            <a:avLst/>
+          </a:prstGeom>
+          <a:noFill/>
+        </p:spPr>
+        <p:txBody>
+          <a:bodyPr wrap="square" rtlCol="0">
+            <a:spAutoFit/>
+          </a:bodyPr>
+          <a:lstStyle/>
+          <a:p>
+            <a:r>
+              <a:rPr lang="en-US" altLang="ko-KR" dirty="0"/>
+              <a:t>1. User</a:t>
+            </a:r>
+            <a:r>
+              <a:rPr lang="ko-KR" altLang="en-US" dirty="0"/>
+              <a:t>가 회의실 내부에서 </a:t>
+            </a:r>
+            <a:br>
+              <a:rPr lang="en-US" altLang="ko-KR" dirty="0"/>
+            </a:br>
+            <a:r>
+              <a:rPr lang="ko-KR" altLang="en-US" dirty="0"/>
+              <a:t>이동하지 않을 경우</a:t>
+            </a:r>
+            <a:endParaRPr lang="en-US" altLang="ko-KR" dirty="0"/>
+          </a:p>
+          <a:p>
+            <a:r>
+              <a:rPr lang="en-US" altLang="ko-KR" dirty="0"/>
+              <a:t>-&gt; enable</a:t>
+            </a:r>
+            <a:r>
+              <a:rPr lang="ko-KR" altLang="en-US" dirty="0"/>
+              <a:t>로 제어해도 크게 상관없음</a:t>
+            </a:r>
+          </a:p>
+        </p:txBody>
+      </p:sp>
+      <p:sp>
+        <p:nvSpPr>
+          <p:cNvPr id="33" name="TextBox 32">
+            <a:extLst>
+              <a:ext uri="{FF2B5EF4-FFF2-40B4-BE49-F238E27FC236}">
+                <a16:creationId xmlns:a16="http://schemas.microsoft.com/office/drawing/2014/main" id="{37F7503E-D9FC-6804-CD78-A5B157DE4635}"/>
+              </a:ext>
+            </a:extLst>
+          </p:cNvPr>
+          <p:cNvSpPr txBox="1"/>
+          <p:nvPr/>
+        </p:nvSpPr>
+        <p:spPr>
+          <a:xfrm>
+            <a:off x="9274333" y="5146134"/>
+            <a:ext cx="2917668" cy="923330"/>
+          </a:xfrm>
+          <a:prstGeom prst="rect">
+            <a:avLst/>
+          </a:prstGeom>
+          <a:noFill/>
+        </p:spPr>
+        <p:txBody>
+          <a:bodyPr wrap="square" rtlCol="0">
+            <a:spAutoFit/>
+          </a:bodyPr>
+          <a:lstStyle/>
+          <a:p>
+            <a:r>
+              <a:rPr lang="en-US" altLang="ko-KR" dirty="0"/>
+              <a:t>2. User</a:t>
+            </a:r>
+            <a:r>
+              <a:rPr lang="ko-KR" altLang="en-US" dirty="0"/>
+              <a:t>가 회의실을 나갔다 </a:t>
+            </a:r>
+            <a:r>
+              <a:rPr lang="ko-KR" altLang="en-US" dirty="0" err="1"/>
+              <a:t>재접속</a:t>
+            </a:r>
+            <a:r>
+              <a:rPr lang="ko-KR" altLang="en-US" dirty="0"/>
+              <a:t> 할 경우</a:t>
+            </a:r>
+            <a:endParaRPr lang="en-US" altLang="ko-KR" dirty="0"/>
+          </a:p>
+          <a:p>
+            <a:r>
+              <a:rPr lang="en-US" altLang="ko-KR" b="1" dirty="0"/>
+              <a:t>-&gt; refresh </a:t>
+            </a:r>
+            <a:r>
+              <a:rPr lang="ko-KR" altLang="en-US" b="1" dirty="0"/>
+              <a:t>필요</a:t>
+            </a:r>
+          </a:p>
+        </p:txBody>
+      </p:sp>
+      <p:sp>
+        <p:nvSpPr>
+          <p:cNvPr id="34" name="TextBox 33">
+            <a:extLst>
+              <a:ext uri="{FF2B5EF4-FFF2-40B4-BE49-F238E27FC236}">
+                <a16:creationId xmlns:a16="http://schemas.microsoft.com/office/drawing/2014/main" id="{C8656AB6-80E7-F281-2341-685CA2B8777A}"/>
+              </a:ext>
+            </a:extLst>
+          </p:cNvPr>
+          <p:cNvSpPr txBox="1"/>
+          <p:nvPr/>
+        </p:nvSpPr>
+        <p:spPr>
+          <a:xfrm>
+            <a:off x="8200330" y="6069464"/>
+            <a:ext cx="3991670" cy="369332"/>
+          </a:xfrm>
+          <a:prstGeom prst="rect">
+            <a:avLst/>
+          </a:prstGeom>
+          <a:noFill/>
+        </p:spPr>
+        <p:txBody>
+          <a:bodyPr wrap="none" rtlCol="0">
+            <a:spAutoFit/>
+          </a:bodyPr>
+          <a:lstStyle/>
+          <a:p>
+            <a:r>
+              <a:rPr lang="ko-KR" altLang="en-US" dirty="0"/>
+              <a:t>결론 </a:t>
+            </a:r>
+            <a:r>
+              <a:rPr lang="en-US" altLang="ko-KR" dirty="0"/>
+              <a:t>: </a:t>
+            </a:r>
+            <a:r>
+              <a:rPr lang="ko-KR" altLang="en-US" dirty="0"/>
+              <a:t>능력이 되면 </a:t>
+            </a:r>
+            <a:r>
+              <a:rPr lang="en-US" altLang="ko-KR" dirty="0"/>
+              <a:t>refreshing </a:t>
+            </a:r>
+            <a:r>
+              <a:rPr lang="ko-KR" altLang="en-US" dirty="0"/>
+              <a:t>시키자</a:t>
+            </a:r>
+          </a:p>
+        </p:txBody>
+      </p:sp>
+    </p:spTree>
+    <p:extLst>
+      <p:ext uri="{BB962C8B-B14F-4D97-AF65-F5344CB8AC3E}">
+        <p14:creationId xmlns:p14="http://schemas.microsoft.com/office/powerpoint/2010/main" val="1565692189"/>
+      </p:ext>
+    </p:extLst>
+  </p:cSld>
+  <p:clrMapOvr>
+    <a:masterClrMapping/>
+  </p:clrMapOvr>
+</p:sld>
+</file>
+
 <file path=ppt/theme/theme1.xml><?xml version="1.0" encoding="utf-8"?>
 <a:theme xmlns:a="http://schemas.openxmlformats.org/drawingml/2006/main" name="Office 테마">
   <a:themeElements>

</xml_diff>